<commit_message>
fix problems with network generator
</commit_message>
<xml_diff>
--- a/inst/Preparation.pptx
+++ b/inst/Preparation.pptx
@@ -126,6 +126,30 @@
 <file path=ppt/changesInfos/changesInfo1.xml><?xml version="1.0" encoding="utf-8"?>
 <pc:chgInfo xmlns:a="http://schemas.openxmlformats.org/drawingml/2006/main" xmlns:r="http://schemas.openxmlformats.org/officeDocument/2006/relationships" xmlns:ac="http://schemas.microsoft.com/office/drawing/2013/main/command" xmlns:pc="http://schemas.microsoft.com/office/powerpoint/2013/main/command">
   <pc:docChgLst>
+    <pc:chgData name="Liu, Youzhong [JANBE]" userId="2d0f794a-fd2a-4e4a-9685-8efd566e499f" providerId="ADAL" clId="{D8A39EC7-E728-43C6-8646-720616CB2D73}"/>
+    <pc:docChg chg="modSld">
+      <pc:chgData name="Liu, Youzhong [JANBE]" userId="2d0f794a-fd2a-4e4a-9685-8efd566e499f" providerId="ADAL" clId="{D8A39EC7-E728-43C6-8646-720616CB2D73}" dt="2020-07-23T17:04:27.042" v="67" actId="20577"/>
+      <pc:docMkLst>
+        <pc:docMk/>
+      </pc:docMkLst>
+      <pc:sldChg chg="modSp">
+        <pc:chgData name="Liu, Youzhong [JANBE]" userId="2d0f794a-fd2a-4e4a-9685-8efd566e499f" providerId="ADAL" clId="{D8A39EC7-E728-43C6-8646-720616CB2D73}" dt="2020-07-23T17:04:27.042" v="67" actId="20577"/>
+        <pc:sldMkLst>
+          <pc:docMk/>
+          <pc:sldMk cId="2668161777" sldId="270"/>
+        </pc:sldMkLst>
+        <pc:graphicFrameChg chg="mod modGraphic">
+          <ac:chgData name="Liu, Youzhong [JANBE]" userId="2d0f794a-fd2a-4e4a-9685-8efd566e499f" providerId="ADAL" clId="{D8A39EC7-E728-43C6-8646-720616CB2D73}" dt="2020-07-23T17:04:27.042" v="67" actId="20577"/>
+          <ac:graphicFrameMkLst>
+            <pc:docMk/>
+            <pc:sldMk cId="2668161777" sldId="270"/>
+            <ac:graphicFrameMk id="4" creationId="{ABEAA127-1C90-4DBB-9260-B26C6B3F5649}"/>
+          </ac:graphicFrameMkLst>
+        </pc:graphicFrameChg>
+      </pc:sldChg>
+    </pc:docChg>
+  </pc:docChgLst>
+  <pc:docChgLst>
     <pc:chgData name="Liu, Youzhong [JANBE]" userId="2d0f794a-fd2a-4e4a-9685-8efd566e499f" providerId="ADAL" clId="{D1EE8339-1FB3-4B25-9618-3EC57C51B59F}"/>
     <pc:docChg chg="undo custSel addSld delSld modSld">
       <pc:chgData name="Liu, Youzhong [JANBE]" userId="2d0f794a-fd2a-4e4a-9685-8efd566e499f" providerId="ADAL" clId="{D1EE8339-1FB3-4B25-9618-3EC57C51B59F}" dt="2020-06-23T17:57:34.138" v="11" actId="1076"/>
@@ -278,7 +302,7 @@
           <a:p>
             <a:fld id="{DB793187-038D-46E7-93F5-6A59D77E4888}" type="datetimeFigureOut">
               <a:rPr lang="en-US" smtClean="0"/>
-              <a:t>6/23/2020</a:t>
+              <a:t>7/23/2020</a:t>
             </a:fld>
             <a:endParaRPr lang="en-US"/>
           </a:p>
@@ -779,7 +803,7 @@
           <a:p>
             <a:fld id="{63C097CE-CE30-40FD-8349-F85D75ED7B0A}" type="datetimeFigureOut">
               <a:rPr lang="en-US" smtClean="0"/>
-              <a:t>6/23/2020</a:t>
+              <a:t>7/23/2020</a:t>
             </a:fld>
             <a:endParaRPr lang="en-US"/>
           </a:p>
@@ -979,7 +1003,7 @@
           <a:p>
             <a:fld id="{63C097CE-CE30-40FD-8349-F85D75ED7B0A}" type="datetimeFigureOut">
               <a:rPr lang="en-US" smtClean="0"/>
-              <a:t>6/23/2020</a:t>
+              <a:t>7/23/2020</a:t>
             </a:fld>
             <a:endParaRPr lang="en-US"/>
           </a:p>
@@ -1189,7 +1213,7 @@
           <a:p>
             <a:fld id="{63C097CE-CE30-40FD-8349-F85D75ED7B0A}" type="datetimeFigureOut">
               <a:rPr lang="en-US" smtClean="0"/>
-              <a:t>6/23/2020</a:t>
+              <a:t>7/23/2020</a:t>
             </a:fld>
             <a:endParaRPr lang="en-US"/>
           </a:p>
@@ -1389,7 +1413,7 @@
           <a:p>
             <a:fld id="{63C097CE-CE30-40FD-8349-F85D75ED7B0A}" type="datetimeFigureOut">
               <a:rPr lang="en-US" smtClean="0"/>
-              <a:t>6/23/2020</a:t>
+              <a:t>7/23/2020</a:t>
             </a:fld>
             <a:endParaRPr lang="en-US"/>
           </a:p>
@@ -1665,7 +1689,7 @@
           <a:p>
             <a:fld id="{63C097CE-CE30-40FD-8349-F85D75ED7B0A}" type="datetimeFigureOut">
               <a:rPr lang="en-US" smtClean="0"/>
-              <a:t>6/23/2020</a:t>
+              <a:t>7/23/2020</a:t>
             </a:fld>
             <a:endParaRPr lang="en-US"/>
           </a:p>
@@ -1933,7 +1957,7 @@
           <a:p>
             <a:fld id="{63C097CE-CE30-40FD-8349-F85D75ED7B0A}" type="datetimeFigureOut">
               <a:rPr lang="en-US" smtClean="0"/>
-              <a:t>6/23/2020</a:t>
+              <a:t>7/23/2020</a:t>
             </a:fld>
             <a:endParaRPr lang="en-US"/>
           </a:p>
@@ -2348,7 +2372,7 @@
           <a:p>
             <a:fld id="{63C097CE-CE30-40FD-8349-F85D75ED7B0A}" type="datetimeFigureOut">
               <a:rPr lang="en-US" smtClean="0"/>
-              <a:t>6/23/2020</a:t>
+              <a:t>7/23/2020</a:t>
             </a:fld>
             <a:endParaRPr lang="en-US"/>
           </a:p>
@@ -2490,7 +2514,7 @@
           <a:p>
             <a:fld id="{63C097CE-CE30-40FD-8349-F85D75ED7B0A}" type="datetimeFigureOut">
               <a:rPr lang="en-US" smtClean="0"/>
-              <a:t>6/23/2020</a:t>
+              <a:t>7/23/2020</a:t>
             </a:fld>
             <a:endParaRPr lang="en-US"/>
           </a:p>
@@ -2603,7 +2627,7 @@
           <a:p>
             <a:fld id="{63C097CE-CE30-40FD-8349-F85D75ED7B0A}" type="datetimeFigureOut">
               <a:rPr lang="en-US" smtClean="0"/>
-              <a:t>6/23/2020</a:t>
+              <a:t>7/23/2020</a:t>
             </a:fld>
             <a:endParaRPr lang="en-US"/>
           </a:p>
@@ -2916,7 +2940,7 @@
           <a:p>
             <a:fld id="{63C097CE-CE30-40FD-8349-F85D75ED7B0A}" type="datetimeFigureOut">
               <a:rPr lang="en-US" smtClean="0"/>
-              <a:t>6/23/2020</a:t>
+              <a:t>7/23/2020</a:t>
             </a:fld>
             <a:endParaRPr lang="en-US"/>
           </a:p>
@@ -3205,7 +3229,7 @@
           <a:p>
             <a:fld id="{63C097CE-CE30-40FD-8349-F85D75ED7B0A}" type="datetimeFigureOut">
               <a:rPr lang="en-US" smtClean="0"/>
-              <a:t>6/23/2020</a:t>
+              <a:t>7/23/2020</a:t>
             </a:fld>
             <a:endParaRPr lang="en-US"/>
           </a:p>
@@ -3448,7 +3472,7 @@
           <a:p>
             <a:fld id="{63C097CE-CE30-40FD-8349-F85D75ED7B0A}" type="datetimeFigureOut">
               <a:rPr lang="en-US" smtClean="0"/>
-              <a:t>6/23/2020</a:t>
+              <a:t>7/23/2020</a:t>
             </a:fld>
             <a:endParaRPr lang="en-US"/>
           </a:p>
@@ -3880,14 +3904,14 @@
           <p:nvPr>
             <p:extLst>
               <p:ext uri="{D42A27DB-BD31-4B8C-83A1-F6EECF244321}">
-                <p14:modId xmlns:p14="http://schemas.microsoft.com/office/powerpoint/2010/main" val="2282387904"/>
+                <p14:modId xmlns:p14="http://schemas.microsoft.com/office/powerpoint/2010/main" val="1301542696"/>
               </p:ext>
             </p:extLst>
           </p:nvPr>
         </p:nvGraphicFramePr>
         <p:xfrm>
-          <a:off x="875792" y="1142695"/>
-          <a:ext cx="10757188" cy="4572610"/>
+          <a:off x="263470" y="1106895"/>
+          <a:ext cx="11582910" cy="4298290"/>
         </p:xfrm>
         <a:graphic>
           <a:graphicData uri="http://schemas.openxmlformats.org/drawingml/2006/table">
@@ -3896,28 +3920,28 @@
                 <a:tableStyleId>{5C22544A-7EE6-4342-B048-85BDC9FD1C3A}</a:tableStyleId>
               </a:tblPr>
               <a:tblGrid>
-                <a:gridCol w="3124750">
+                <a:gridCol w="3364606">
                   <a:extLst>
                     <a:ext uri="{9D8B030D-6E8A-4147-A177-3AD203B41FA5}">
                       <a16:colId xmlns:a16="http://schemas.microsoft.com/office/drawing/2014/main" val="532535257"/>
                     </a:ext>
                   </a:extLst>
                 </a:gridCol>
-                <a:gridCol w="2200629">
+                <a:gridCol w="2369549">
                   <a:extLst>
                     <a:ext uri="{9D8B030D-6E8A-4147-A177-3AD203B41FA5}">
                       <a16:colId xmlns:a16="http://schemas.microsoft.com/office/drawing/2014/main" val="2523763964"/>
                     </a:ext>
                   </a:extLst>
                 </a:gridCol>
-                <a:gridCol w="2593074">
+                <a:gridCol w="2792118">
                   <a:extLst>
                     <a:ext uri="{9D8B030D-6E8A-4147-A177-3AD203B41FA5}">
                       <a16:colId xmlns:a16="http://schemas.microsoft.com/office/drawing/2014/main" val="3600682559"/>
                     </a:ext>
                   </a:extLst>
                 </a:gridCol>
-                <a:gridCol w="2838735">
+                <a:gridCol w="3056637">
                   <a:extLst>
                     <a:ext uri="{9D8B030D-6E8A-4147-A177-3AD203B41FA5}">
                       <a16:colId xmlns:a16="http://schemas.microsoft.com/office/drawing/2014/main" val="2992362965"/>
@@ -4490,9 +4514,10 @@
                     <a:lstStyle/>
                     <a:p>
                       <a:r>
-                        <a:rPr lang="en-US" dirty="0"/>
-                        <a:t>Recalibration T/F</a:t>
+                        <a:rPr lang="en-US"/>
+                        <a:t>Recalibration </a:t>
                       </a:r>
+                      <a:endParaRPr lang="en-US" dirty="0"/>
                     </a:p>
                   </a:txBody>
                   <a:tcPr/>

</xml_diff>

<commit_message>
consensus library molecular networking
</commit_message>
<xml_diff>
--- a/inst/Preparation.pptx
+++ b/inst/Preparation.pptx
@@ -217,6 +217,30 @@
       </pc:sldChg>
     </pc:docChg>
   </pc:docChgLst>
+  <pc:docChgLst>
+    <pc:chgData name="Liu, Youzhong [JANBE]" userId="2d0f794a-fd2a-4e4a-9685-8efd566e499f" providerId="ADAL" clId="{3EC71F49-CC0E-477B-A4D6-709D7114ECCA}"/>
+    <pc:docChg chg="modSld">
+      <pc:chgData name="Liu, Youzhong [JANBE]" userId="2d0f794a-fd2a-4e4a-9685-8efd566e499f" providerId="ADAL" clId="{3EC71F49-CC0E-477B-A4D6-709D7114ECCA}" dt="2020-08-20T09:32:58.768" v="8" actId="20577"/>
+      <pc:docMkLst>
+        <pc:docMk/>
+      </pc:docMkLst>
+      <pc:sldChg chg="modSp">
+        <pc:chgData name="Liu, Youzhong [JANBE]" userId="2d0f794a-fd2a-4e4a-9685-8efd566e499f" providerId="ADAL" clId="{3EC71F49-CC0E-477B-A4D6-709D7114ECCA}" dt="2020-08-20T09:32:58.768" v="8" actId="20577"/>
+        <pc:sldMkLst>
+          <pc:docMk/>
+          <pc:sldMk cId="2668161777" sldId="270"/>
+        </pc:sldMkLst>
+        <pc:graphicFrameChg chg="modGraphic">
+          <ac:chgData name="Liu, Youzhong [JANBE]" userId="2d0f794a-fd2a-4e4a-9685-8efd566e499f" providerId="ADAL" clId="{3EC71F49-CC0E-477B-A4D6-709D7114ECCA}" dt="2020-08-20T09:32:58.768" v="8" actId="20577"/>
+          <ac:graphicFrameMkLst>
+            <pc:docMk/>
+            <pc:sldMk cId="2668161777" sldId="270"/>
+            <ac:graphicFrameMk id="4" creationId="{ABEAA127-1C90-4DBB-9260-B26C6B3F5649}"/>
+          </ac:graphicFrameMkLst>
+        </pc:graphicFrameChg>
+      </pc:sldChg>
+    </pc:docChg>
+  </pc:docChgLst>
 </pc:chgInfo>
 </file>
 
@@ -302,7 +326,7 @@
           <a:p>
             <a:fld id="{DB793187-038D-46E7-93F5-6A59D77E4888}" type="datetimeFigureOut">
               <a:rPr lang="en-US" smtClean="0"/>
-              <a:t>7/23/2020</a:t>
+              <a:t>8/20/2020</a:t>
             </a:fld>
             <a:endParaRPr lang="en-US"/>
           </a:p>
@@ -803,7 +827,7 @@
           <a:p>
             <a:fld id="{63C097CE-CE30-40FD-8349-F85D75ED7B0A}" type="datetimeFigureOut">
               <a:rPr lang="en-US" smtClean="0"/>
-              <a:t>7/23/2020</a:t>
+              <a:t>8/20/2020</a:t>
             </a:fld>
             <a:endParaRPr lang="en-US"/>
           </a:p>
@@ -1003,7 +1027,7 @@
           <a:p>
             <a:fld id="{63C097CE-CE30-40FD-8349-F85D75ED7B0A}" type="datetimeFigureOut">
               <a:rPr lang="en-US" smtClean="0"/>
-              <a:t>7/23/2020</a:t>
+              <a:t>8/20/2020</a:t>
             </a:fld>
             <a:endParaRPr lang="en-US"/>
           </a:p>
@@ -1213,7 +1237,7 @@
           <a:p>
             <a:fld id="{63C097CE-CE30-40FD-8349-F85D75ED7B0A}" type="datetimeFigureOut">
               <a:rPr lang="en-US" smtClean="0"/>
-              <a:t>7/23/2020</a:t>
+              <a:t>8/20/2020</a:t>
             </a:fld>
             <a:endParaRPr lang="en-US"/>
           </a:p>
@@ -1413,7 +1437,7 @@
           <a:p>
             <a:fld id="{63C097CE-CE30-40FD-8349-F85D75ED7B0A}" type="datetimeFigureOut">
               <a:rPr lang="en-US" smtClean="0"/>
-              <a:t>7/23/2020</a:t>
+              <a:t>8/20/2020</a:t>
             </a:fld>
             <a:endParaRPr lang="en-US"/>
           </a:p>
@@ -1689,7 +1713,7 @@
           <a:p>
             <a:fld id="{63C097CE-CE30-40FD-8349-F85D75ED7B0A}" type="datetimeFigureOut">
               <a:rPr lang="en-US" smtClean="0"/>
-              <a:t>7/23/2020</a:t>
+              <a:t>8/20/2020</a:t>
             </a:fld>
             <a:endParaRPr lang="en-US"/>
           </a:p>
@@ -1957,7 +1981,7 @@
           <a:p>
             <a:fld id="{63C097CE-CE30-40FD-8349-F85D75ED7B0A}" type="datetimeFigureOut">
               <a:rPr lang="en-US" smtClean="0"/>
-              <a:t>7/23/2020</a:t>
+              <a:t>8/20/2020</a:t>
             </a:fld>
             <a:endParaRPr lang="en-US"/>
           </a:p>
@@ -2372,7 +2396,7 @@
           <a:p>
             <a:fld id="{63C097CE-CE30-40FD-8349-F85D75ED7B0A}" type="datetimeFigureOut">
               <a:rPr lang="en-US" smtClean="0"/>
-              <a:t>7/23/2020</a:t>
+              <a:t>8/20/2020</a:t>
             </a:fld>
             <a:endParaRPr lang="en-US"/>
           </a:p>
@@ -2514,7 +2538,7 @@
           <a:p>
             <a:fld id="{63C097CE-CE30-40FD-8349-F85D75ED7B0A}" type="datetimeFigureOut">
               <a:rPr lang="en-US" smtClean="0"/>
-              <a:t>7/23/2020</a:t>
+              <a:t>8/20/2020</a:t>
             </a:fld>
             <a:endParaRPr lang="en-US"/>
           </a:p>
@@ -2627,7 +2651,7 @@
           <a:p>
             <a:fld id="{63C097CE-CE30-40FD-8349-F85D75ED7B0A}" type="datetimeFigureOut">
               <a:rPr lang="en-US" smtClean="0"/>
-              <a:t>7/23/2020</a:t>
+              <a:t>8/20/2020</a:t>
             </a:fld>
             <a:endParaRPr lang="en-US"/>
           </a:p>
@@ -2940,7 +2964,7 @@
           <a:p>
             <a:fld id="{63C097CE-CE30-40FD-8349-F85D75ED7B0A}" type="datetimeFigureOut">
               <a:rPr lang="en-US" smtClean="0"/>
-              <a:t>7/23/2020</a:t>
+              <a:t>8/20/2020</a:t>
             </a:fld>
             <a:endParaRPr lang="en-US"/>
           </a:p>
@@ -3229,7 +3253,7 @@
           <a:p>
             <a:fld id="{63C097CE-CE30-40FD-8349-F85D75ED7B0A}" type="datetimeFigureOut">
               <a:rPr lang="en-US" smtClean="0"/>
-              <a:t>7/23/2020</a:t>
+              <a:t>8/20/2020</a:t>
             </a:fld>
             <a:endParaRPr lang="en-US"/>
           </a:p>
@@ -3472,7 +3496,7 @@
           <a:p>
             <a:fld id="{63C097CE-CE30-40FD-8349-F85D75ED7B0A}" type="datetimeFigureOut">
               <a:rPr lang="en-US" smtClean="0"/>
-              <a:t>7/23/2020</a:t>
+              <a:t>8/20/2020</a:t>
             </a:fld>
             <a:endParaRPr lang="en-US"/>
           </a:p>
@@ -3904,7 +3928,7 @@
           <p:nvPr>
             <p:extLst>
               <p:ext uri="{D42A27DB-BD31-4B8C-83A1-F6EECF244321}">
-                <p14:modId xmlns:p14="http://schemas.microsoft.com/office/powerpoint/2010/main" val="1301542696"/>
+                <p14:modId xmlns:p14="http://schemas.microsoft.com/office/powerpoint/2010/main" val="1536164478"/>
               </p:ext>
             </p:extLst>
           </p:nvPr>
@@ -4289,7 +4313,7 @@
                     <a:p>
                       <a:r>
                         <a:rPr lang="en-US" dirty="0"/>
-                        <a:t>Input Metadata (Optional)</a:t>
+                        <a:t>Input Metadata (Suggested)</a:t>
                       </a:r>
                     </a:p>
                   </a:txBody>

</xml_diff>

<commit_message>
Library search slowness fix
</commit_message>
<xml_diff>
--- a/inst/Preparation.pptx
+++ b/inst/Preparation.pptx
@@ -5,7 +5,7 @@
     <p:sldMasterId id="2147483648" r:id="rId1"/>
   </p:sldMasterIdLst>
   <p:notesMasterIdLst>
-    <p:notesMasterId r:id="rId14"/>
+    <p:notesMasterId r:id="rId16"/>
   </p:notesMasterIdLst>
   <p:sldIdLst>
     <p:sldId id="270" r:id="rId2"/>
@@ -20,6 +20,8 @@
     <p:sldId id="269" r:id="rId11"/>
     <p:sldId id="272" r:id="rId12"/>
     <p:sldId id="273" r:id="rId13"/>
+    <p:sldId id="274" r:id="rId14"/>
+    <p:sldId id="275" r:id="rId15"/>
   </p:sldIdLst>
   <p:sldSz cx="12192000" cy="6858000"/>
   <p:notesSz cx="6858000" cy="9144000"/>
@@ -223,7 +225,7 @@
   <pc:docChgLst>
     <pc:chgData name="Liu, Youzhong [JANBE]" userId="2d0f794a-fd2a-4e4a-9685-8efd566e499f" providerId="ADAL" clId="{00318541-1CF4-4CB2-A5A1-71AFCDF8FB1B}"/>
     <pc:docChg chg="undo custSel addSld modSld">
-      <pc:chgData name="Liu, Youzhong [JANBE]" userId="2d0f794a-fd2a-4e4a-9685-8efd566e499f" providerId="ADAL" clId="{00318541-1CF4-4CB2-A5A1-71AFCDF8FB1B}" dt="2022-09-07T21:00:20.120" v="993" actId="114"/>
+      <pc:chgData name="Liu, Youzhong [JANBE]" userId="2d0f794a-fd2a-4e4a-9685-8efd566e499f" providerId="ADAL" clId="{00318541-1CF4-4CB2-A5A1-71AFCDF8FB1B}" dt="2022-10-02T10:21:52.339" v="1105" actId="1035"/>
       <pc:docMkLst>
         <pc:docMk/>
       </pc:docMkLst>
@@ -505,6 +507,172 @@
           </ac:cxnSpMkLst>
         </pc:cxnChg>
       </pc:sldChg>
+      <pc:sldChg chg="addSp delSp modSp new mod">
+        <pc:chgData name="Liu, Youzhong [JANBE]" userId="2d0f794a-fd2a-4e4a-9685-8efd566e499f" providerId="ADAL" clId="{00318541-1CF4-4CB2-A5A1-71AFCDF8FB1B}" dt="2022-09-29T07:07:42.452" v="1036" actId="478"/>
+        <pc:sldMkLst>
+          <pc:docMk/>
+          <pc:sldMk cId="95536840" sldId="274"/>
+        </pc:sldMkLst>
+        <pc:spChg chg="del">
+          <ac:chgData name="Liu, Youzhong [JANBE]" userId="2d0f794a-fd2a-4e4a-9685-8efd566e499f" providerId="ADAL" clId="{00318541-1CF4-4CB2-A5A1-71AFCDF8FB1B}" dt="2022-09-29T06:30:56.338" v="995" actId="478"/>
+          <ac:spMkLst>
+            <pc:docMk/>
+            <pc:sldMk cId="95536840" sldId="274"/>
+            <ac:spMk id="2" creationId="{E6A0C14D-E6C7-47A3-99C7-767A3B9E8752}"/>
+          </ac:spMkLst>
+        </pc:spChg>
+        <pc:spChg chg="del">
+          <ac:chgData name="Liu, Youzhong [JANBE]" userId="2d0f794a-fd2a-4e4a-9685-8efd566e499f" providerId="ADAL" clId="{00318541-1CF4-4CB2-A5A1-71AFCDF8FB1B}" dt="2022-09-29T06:30:56.338" v="995" actId="478"/>
+          <ac:spMkLst>
+            <pc:docMk/>
+            <pc:sldMk cId="95536840" sldId="274"/>
+            <ac:spMk id="3" creationId="{7ADAC34D-219B-472B-90D9-81936789575B}"/>
+          </ac:spMkLst>
+        </pc:spChg>
+        <pc:spChg chg="add del">
+          <ac:chgData name="Liu, Youzhong [JANBE]" userId="2d0f794a-fd2a-4e4a-9685-8efd566e499f" providerId="ADAL" clId="{00318541-1CF4-4CB2-A5A1-71AFCDF8FB1B}" dt="2022-09-29T06:33:33.205" v="999"/>
+          <ac:spMkLst>
+            <pc:docMk/>
+            <pc:sldMk cId="95536840" sldId="274"/>
+            <ac:spMk id="4" creationId="{4C15B316-4486-4109-B413-6025E2F9B383}"/>
+          </ac:spMkLst>
+        </pc:spChg>
+        <pc:spChg chg="add del">
+          <ac:chgData name="Liu, Youzhong [JANBE]" userId="2d0f794a-fd2a-4e4a-9685-8efd566e499f" providerId="ADAL" clId="{00318541-1CF4-4CB2-A5A1-71AFCDF8FB1B}" dt="2022-09-29T06:53:17.503" v="1008"/>
+          <ac:spMkLst>
+            <pc:docMk/>
+            <pc:sldMk cId="95536840" sldId="274"/>
+            <ac:spMk id="6" creationId="{60B9646B-7FF5-42CE-BB89-09F6EAB02D8C}"/>
+          </ac:spMkLst>
+        </pc:spChg>
+        <pc:spChg chg="add del">
+          <ac:chgData name="Liu, Youzhong [JANBE]" userId="2d0f794a-fd2a-4e4a-9685-8efd566e499f" providerId="ADAL" clId="{00318541-1CF4-4CB2-A5A1-71AFCDF8FB1B}" dt="2022-09-29T06:53:38.778" v="1015"/>
+          <ac:spMkLst>
+            <pc:docMk/>
+            <pc:sldMk cId="95536840" sldId="274"/>
+            <ac:spMk id="8" creationId="{40CE59A6-B857-44F1-BBDB-CB0CE4F21E1F}"/>
+          </ac:spMkLst>
+        </pc:spChg>
+        <pc:spChg chg="add del">
+          <ac:chgData name="Liu, Youzhong [JANBE]" userId="2d0f794a-fd2a-4e4a-9685-8efd566e499f" providerId="ADAL" clId="{00318541-1CF4-4CB2-A5A1-71AFCDF8FB1B}" dt="2022-09-29T06:59:12.471" v="1023"/>
+          <ac:spMkLst>
+            <pc:docMk/>
+            <pc:sldMk cId="95536840" sldId="274"/>
+            <ac:spMk id="10" creationId="{1260CAAC-9017-438F-AD04-8C7CEC1CBDDA}"/>
+          </ac:spMkLst>
+        </pc:spChg>
+        <pc:picChg chg="add del mod modCrop">
+          <ac:chgData name="Liu, Youzhong [JANBE]" userId="2d0f794a-fd2a-4e4a-9685-8efd566e499f" providerId="ADAL" clId="{00318541-1CF4-4CB2-A5A1-71AFCDF8FB1B}" dt="2022-09-29T06:53:14.563" v="1004" actId="478"/>
+          <ac:picMkLst>
+            <pc:docMk/>
+            <pc:sldMk cId="95536840" sldId="274"/>
+            <ac:picMk id="5" creationId="{149BF75F-A8D2-4881-92EF-85F442051A1C}"/>
+          </ac:picMkLst>
+        </pc:picChg>
+        <pc:picChg chg="add del mod">
+          <ac:chgData name="Liu, Youzhong [JANBE]" userId="2d0f794a-fd2a-4e4a-9685-8efd566e499f" providerId="ADAL" clId="{00318541-1CF4-4CB2-A5A1-71AFCDF8FB1B}" dt="2022-09-29T06:53:25.851" v="1011" actId="478"/>
+          <ac:picMkLst>
+            <pc:docMk/>
+            <pc:sldMk cId="95536840" sldId="274"/>
+            <ac:picMk id="7" creationId="{6C4C4234-8617-4600-B6F4-1155BA5C0E5E}"/>
+          </ac:picMkLst>
+        </pc:picChg>
+        <pc:picChg chg="add del mod modCrop">
+          <ac:chgData name="Liu, Youzhong [JANBE]" userId="2d0f794a-fd2a-4e4a-9685-8efd566e499f" providerId="ADAL" clId="{00318541-1CF4-4CB2-A5A1-71AFCDF8FB1B}" dt="2022-09-29T07:00:12.416" v="1033" actId="21"/>
+          <ac:picMkLst>
+            <pc:docMk/>
+            <pc:sldMk cId="95536840" sldId="274"/>
+            <ac:picMk id="9" creationId="{CD9AE17F-B3E5-4A56-A8B7-A22330B6C57E}"/>
+          </ac:picMkLst>
+        </pc:picChg>
+        <pc:picChg chg="add del mod modCrop">
+          <ac:chgData name="Liu, Youzhong [JANBE]" userId="2d0f794a-fd2a-4e4a-9685-8efd566e499f" providerId="ADAL" clId="{00318541-1CF4-4CB2-A5A1-71AFCDF8FB1B}" dt="2022-09-29T07:00:12.416" v="1033" actId="21"/>
+          <ac:picMkLst>
+            <pc:docMk/>
+            <pc:sldMk cId="95536840" sldId="274"/>
+            <ac:picMk id="11" creationId="{92174A94-9454-4288-9554-DAE4CF1F4D6E}"/>
+          </ac:picMkLst>
+        </pc:picChg>
+        <pc:picChg chg="add del">
+          <ac:chgData name="Liu, Youzhong [JANBE]" userId="2d0f794a-fd2a-4e4a-9685-8efd566e499f" providerId="ADAL" clId="{00318541-1CF4-4CB2-A5A1-71AFCDF8FB1B}" dt="2022-09-29T07:07:42.452" v="1036" actId="478"/>
+          <ac:picMkLst>
+            <pc:docMk/>
+            <pc:sldMk cId="95536840" sldId="274"/>
+            <ac:picMk id="12" creationId="{E1E7670C-E707-4386-949B-AB867FC9CB73}"/>
+          </ac:picMkLst>
+        </pc:picChg>
+      </pc:sldChg>
+      <pc:sldChg chg="addSp delSp modSp new mod">
+        <pc:chgData name="Liu, Youzhong [JANBE]" userId="2d0f794a-fd2a-4e4a-9685-8efd566e499f" providerId="ADAL" clId="{00318541-1CF4-4CB2-A5A1-71AFCDF8FB1B}" dt="2022-10-02T10:21:52.339" v="1105" actId="1035"/>
+        <pc:sldMkLst>
+          <pc:docMk/>
+          <pc:sldMk cId="1416786149" sldId="275"/>
+        </pc:sldMkLst>
+        <pc:spChg chg="del">
+          <ac:chgData name="Liu, Youzhong [JANBE]" userId="2d0f794a-fd2a-4e4a-9685-8efd566e499f" providerId="ADAL" clId="{00318541-1CF4-4CB2-A5A1-71AFCDF8FB1B}" dt="2022-10-02T10:16:01.363" v="1038" actId="478"/>
+          <ac:spMkLst>
+            <pc:docMk/>
+            <pc:sldMk cId="1416786149" sldId="275"/>
+            <ac:spMk id="2" creationId="{4A71EDEF-CD96-FD9A-419B-BA21A6498E43}"/>
+          </ac:spMkLst>
+        </pc:spChg>
+        <pc:spChg chg="del">
+          <ac:chgData name="Liu, Youzhong [JANBE]" userId="2d0f794a-fd2a-4e4a-9685-8efd566e499f" providerId="ADAL" clId="{00318541-1CF4-4CB2-A5A1-71AFCDF8FB1B}" dt="2022-10-02T10:16:01.363" v="1038" actId="478"/>
+          <ac:spMkLst>
+            <pc:docMk/>
+            <pc:sldMk cId="1416786149" sldId="275"/>
+            <ac:spMk id="3" creationId="{823791A7-0843-A741-E220-18487CBA5754}"/>
+          </ac:spMkLst>
+        </pc:spChg>
+        <pc:spChg chg="add mod ord">
+          <ac:chgData name="Liu, Youzhong [JANBE]" userId="2d0f794a-fd2a-4e4a-9685-8efd566e499f" providerId="ADAL" clId="{00318541-1CF4-4CB2-A5A1-71AFCDF8FB1B}" dt="2022-10-02T10:21:52.339" v="1105" actId="1035"/>
+          <ac:spMkLst>
+            <pc:docMk/>
+            <pc:sldMk cId="1416786149" sldId="275"/>
+            <ac:spMk id="9" creationId="{C511AE79-4643-5E53-6E9B-681597A565CF}"/>
+          </ac:spMkLst>
+        </pc:spChg>
+        <pc:picChg chg="add mod modCrop">
+          <ac:chgData name="Liu, Youzhong [JANBE]" userId="2d0f794a-fd2a-4e4a-9685-8efd566e499f" providerId="ADAL" clId="{00318541-1CF4-4CB2-A5A1-71AFCDF8FB1B}" dt="2022-10-02T10:18:18.794" v="1057" actId="1076"/>
+          <ac:picMkLst>
+            <pc:docMk/>
+            <pc:sldMk cId="1416786149" sldId="275"/>
+            <ac:picMk id="4" creationId="{BE9B8F98-F511-3709-19E0-5470112F631E}"/>
+          </ac:picMkLst>
+        </pc:picChg>
+        <pc:picChg chg="add mod modCrop">
+          <ac:chgData name="Liu, Youzhong [JANBE]" userId="2d0f794a-fd2a-4e4a-9685-8efd566e499f" providerId="ADAL" clId="{00318541-1CF4-4CB2-A5A1-71AFCDF8FB1B}" dt="2022-10-02T10:18:21.105" v="1058" actId="1076"/>
+          <ac:picMkLst>
+            <pc:docMk/>
+            <pc:sldMk cId="1416786149" sldId="275"/>
+            <ac:picMk id="5" creationId="{BB98F31F-E7E5-663A-24E5-E2BCFCB96E6D}"/>
+          </ac:picMkLst>
+        </pc:picChg>
+        <pc:picChg chg="add mod modCrop">
+          <ac:chgData name="Liu, Youzhong [JANBE]" userId="2d0f794a-fd2a-4e4a-9685-8efd566e499f" providerId="ADAL" clId="{00318541-1CF4-4CB2-A5A1-71AFCDF8FB1B}" dt="2022-10-02T10:19:01.429" v="1069" actId="1076"/>
+          <ac:picMkLst>
+            <pc:docMk/>
+            <pc:sldMk cId="1416786149" sldId="275"/>
+            <ac:picMk id="6" creationId="{84CB10A8-C8B6-0FE5-8B07-086121AB4696}"/>
+          </ac:picMkLst>
+        </pc:picChg>
+        <pc:picChg chg="add mod modCrop">
+          <ac:chgData name="Liu, Youzhong [JANBE]" userId="2d0f794a-fd2a-4e4a-9685-8efd566e499f" providerId="ADAL" clId="{00318541-1CF4-4CB2-A5A1-71AFCDF8FB1B}" dt="2022-10-02T10:19:52.603" v="1078" actId="1076"/>
+          <ac:picMkLst>
+            <pc:docMk/>
+            <pc:sldMk cId="1416786149" sldId="275"/>
+            <ac:picMk id="7" creationId="{E3965929-14DC-AE1F-E5A7-8AFF61607111}"/>
+          </ac:picMkLst>
+        </pc:picChg>
+        <pc:picChg chg="add mod modCrop">
+          <ac:chgData name="Liu, Youzhong [JANBE]" userId="2d0f794a-fd2a-4e4a-9685-8efd566e499f" providerId="ADAL" clId="{00318541-1CF4-4CB2-A5A1-71AFCDF8FB1B}" dt="2022-10-02T10:20:35.146" v="1088" actId="1076"/>
+          <ac:picMkLst>
+            <pc:docMk/>
+            <pc:sldMk cId="1416786149" sldId="275"/>
+            <ac:picMk id="8" creationId="{2B032F40-2959-2EAB-F884-A0743E027188}"/>
+          </ac:picMkLst>
+        </pc:picChg>
+      </pc:sldChg>
     </pc:docChg>
   </pc:docChgLst>
   <pc:docChgLst>
@@ -616,7 +784,7 @@
           <a:p>
             <a:fld id="{DB793187-038D-46E7-93F5-6A59D77E4888}" type="datetimeFigureOut">
               <a:rPr lang="en-US" smtClean="0"/>
-              <a:t>9/7/2022</a:t>
+              <a:t>10/2/2022</a:t>
             </a:fld>
             <a:endParaRPr lang="en-US"/>
           </a:p>
@@ -1117,7 +1285,7 @@
           <a:p>
             <a:fld id="{63C097CE-CE30-40FD-8349-F85D75ED7B0A}" type="datetimeFigureOut">
               <a:rPr lang="en-US" smtClean="0"/>
-              <a:t>9/7/2022</a:t>
+              <a:t>10/2/2022</a:t>
             </a:fld>
             <a:endParaRPr lang="en-US"/>
           </a:p>
@@ -1317,7 +1485,7 @@
           <a:p>
             <a:fld id="{63C097CE-CE30-40FD-8349-F85D75ED7B0A}" type="datetimeFigureOut">
               <a:rPr lang="en-US" smtClean="0"/>
-              <a:t>9/7/2022</a:t>
+              <a:t>10/2/2022</a:t>
             </a:fld>
             <a:endParaRPr lang="en-US"/>
           </a:p>
@@ -1527,7 +1695,7 @@
           <a:p>
             <a:fld id="{63C097CE-CE30-40FD-8349-F85D75ED7B0A}" type="datetimeFigureOut">
               <a:rPr lang="en-US" smtClean="0"/>
-              <a:t>9/7/2022</a:t>
+              <a:t>10/2/2022</a:t>
             </a:fld>
             <a:endParaRPr lang="en-US"/>
           </a:p>
@@ -1727,7 +1895,7 @@
           <a:p>
             <a:fld id="{63C097CE-CE30-40FD-8349-F85D75ED7B0A}" type="datetimeFigureOut">
               <a:rPr lang="en-US" smtClean="0"/>
-              <a:t>9/7/2022</a:t>
+              <a:t>10/2/2022</a:t>
             </a:fld>
             <a:endParaRPr lang="en-US"/>
           </a:p>
@@ -2003,7 +2171,7 @@
           <a:p>
             <a:fld id="{63C097CE-CE30-40FD-8349-F85D75ED7B0A}" type="datetimeFigureOut">
               <a:rPr lang="en-US" smtClean="0"/>
-              <a:t>9/7/2022</a:t>
+              <a:t>10/2/2022</a:t>
             </a:fld>
             <a:endParaRPr lang="en-US"/>
           </a:p>
@@ -2271,7 +2439,7 @@
           <a:p>
             <a:fld id="{63C097CE-CE30-40FD-8349-F85D75ED7B0A}" type="datetimeFigureOut">
               <a:rPr lang="en-US" smtClean="0"/>
-              <a:t>9/7/2022</a:t>
+              <a:t>10/2/2022</a:t>
             </a:fld>
             <a:endParaRPr lang="en-US"/>
           </a:p>
@@ -2686,7 +2854,7 @@
           <a:p>
             <a:fld id="{63C097CE-CE30-40FD-8349-F85D75ED7B0A}" type="datetimeFigureOut">
               <a:rPr lang="en-US" smtClean="0"/>
-              <a:t>9/7/2022</a:t>
+              <a:t>10/2/2022</a:t>
             </a:fld>
             <a:endParaRPr lang="en-US"/>
           </a:p>
@@ -2828,7 +2996,7 @@
           <a:p>
             <a:fld id="{63C097CE-CE30-40FD-8349-F85D75ED7B0A}" type="datetimeFigureOut">
               <a:rPr lang="en-US" smtClean="0"/>
-              <a:t>9/7/2022</a:t>
+              <a:t>10/2/2022</a:t>
             </a:fld>
             <a:endParaRPr lang="en-US"/>
           </a:p>
@@ -2941,7 +3109,7 @@
           <a:p>
             <a:fld id="{63C097CE-CE30-40FD-8349-F85D75ED7B0A}" type="datetimeFigureOut">
               <a:rPr lang="en-US" smtClean="0"/>
-              <a:t>9/7/2022</a:t>
+              <a:t>10/2/2022</a:t>
             </a:fld>
             <a:endParaRPr lang="en-US"/>
           </a:p>
@@ -3254,7 +3422,7 @@
           <a:p>
             <a:fld id="{63C097CE-CE30-40FD-8349-F85D75ED7B0A}" type="datetimeFigureOut">
               <a:rPr lang="en-US" smtClean="0"/>
-              <a:t>9/7/2022</a:t>
+              <a:t>10/2/2022</a:t>
             </a:fld>
             <a:endParaRPr lang="en-US"/>
           </a:p>
@@ -3543,7 +3711,7 @@
           <a:p>
             <a:fld id="{63C097CE-CE30-40FD-8349-F85D75ED7B0A}" type="datetimeFigureOut">
               <a:rPr lang="en-US" smtClean="0"/>
-              <a:t>9/7/2022</a:t>
+              <a:t>10/2/2022</a:t>
             </a:fld>
             <a:endParaRPr lang="en-US"/>
           </a:p>
@@ -3786,7 +3954,7 @@
           <a:p>
             <a:fld id="{63C097CE-CE30-40FD-8349-F85D75ED7B0A}" type="datetimeFigureOut">
               <a:rPr lang="en-US" smtClean="0"/>
-              <a:t>9/7/2022</a:t>
+              <a:t>10/2/2022</a:t>
             </a:fld>
             <a:endParaRPr lang="en-US"/>
           </a:p>
@@ -6267,6 +6435,295 @@
 </p:sld>
 </file>
 
+<file path=ppt/slides/slide13.xml><?xml version="1.0" encoding="utf-8"?>
+<p:sld xmlns:a="http://schemas.openxmlformats.org/drawingml/2006/main" xmlns:r="http://schemas.openxmlformats.org/officeDocument/2006/relationships" xmlns:p="http://schemas.openxmlformats.org/presentationml/2006/main">
+  <p:cSld>
+    <p:spTree>
+      <p:nvGrpSpPr>
+        <p:cNvPr id="1" name=""/>
+        <p:cNvGrpSpPr/>
+        <p:nvPr/>
+      </p:nvGrpSpPr>
+      <p:grpSpPr>
+        <a:xfrm>
+          <a:off x="0" y="0"/>
+          <a:ext cx="0" cy="0"/>
+          <a:chOff x="0" y="0"/>
+          <a:chExt cx="0" cy="0"/>
+        </a:xfrm>
+      </p:grpSpPr>
+      <p:pic>
+        <p:nvPicPr>
+          <p:cNvPr id="12" name="Picture 11">
+            <a:extLst>
+              <a:ext uri="{FF2B5EF4-FFF2-40B4-BE49-F238E27FC236}">
+                <a16:creationId xmlns:a16="http://schemas.microsoft.com/office/drawing/2014/main" id="{E1E7670C-E707-4386-949B-AB867FC9CB73}"/>
+              </a:ext>
+            </a:extLst>
+          </p:cNvPr>
+          <p:cNvPicPr>
+            <a:picLocks noChangeAspect="1"/>
+          </p:cNvPicPr>
+          <p:nvPr/>
+        </p:nvPicPr>
+        <p:blipFill>
+          <a:blip r:embed="rId2"/>
+          <a:stretch>
+            <a:fillRect/>
+          </a:stretch>
+        </p:blipFill>
+        <p:spPr>
+          <a:xfrm>
+            <a:off x="3284973" y="0"/>
+            <a:ext cx="5622053" cy="6858000"/>
+          </a:xfrm>
+          <a:prstGeom prst="rect">
+            <a:avLst/>
+          </a:prstGeom>
+        </p:spPr>
+      </p:pic>
+    </p:spTree>
+    <p:extLst>
+      <p:ext uri="{BB962C8B-B14F-4D97-AF65-F5344CB8AC3E}">
+        <p14:creationId xmlns:p14="http://schemas.microsoft.com/office/powerpoint/2010/main" val="95536840"/>
+      </p:ext>
+    </p:extLst>
+  </p:cSld>
+  <p:clrMapOvr>
+    <a:masterClrMapping/>
+  </p:clrMapOvr>
+</p:sld>
+</file>
+
+<file path=ppt/slides/slide14.xml><?xml version="1.0" encoding="utf-8"?>
+<p:sld xmlns:a="http://schemas.openxmlformats.org/drawingml/2006/main" xmlns:r="http://schemas.openxmlformats.org/officeDocument/2006/relationships" xmlns:p="http://schemas.openxmlformats.org/presentationml/2006/main">
+  <p:cSld>
+    <p:spTree>
+      <p:nvGrpSpPr>
+        <p:cNvPr id="1" name=""/>
+        <p:cNvGrpSpPr/>
+        <p:nvPr/>
+      </p:nvGrpSpPr>
+      <p:grpSpPr>
+        <a:xfrm>
+          <a:off x="0" y="0"/>
+          <a:ext cx="0" cy="0"/>
+          <a:chOff x="0" y="0"/>
+          <a:chExt cx="0" cy="0"/>
+        </a:xfrm>
+      </p:grpSpPr>
+      <p:sp>
+        <p:nvSpPr>
+          <p:cNvPr id="9" name="Rectangle 8">
+            <a:extLst>
+              <a:ext uri="{FF2B5EF4-FFF2-40B4-BE49-F238E27FC236}">
+                <a16:creationId xmlns:a16="http://schemas.microsoft.com/office/drawing/2014/main" id="{C511AE79-4643-5E53-6E9B-681597A565CF}"/>
+              </a:ext>
+            </a:extLst>
+          </p:cNvPr>
+          <p:cNvSpPr/>
+          <p:nvPr/>
+        </p:nvSpPr>
+        <p:spPr>
+          <a:xfrm>
+            <a:off x="240631" y="-176462"/>
+            <a:ext cx="11526066" cy="9689431"/>
+          </a:xfrm>
+          <a:prstGeom prst="rect">
+            <a:avLst/>
+          </a:prstGeom>
+          <a:solidFill>
+            <a:schemeClr val="bg1"/>
+          </a:solidFill>
+          <a:ln>
+            <a:solidFill>
+              <a:schemeClr val="bg1"/>
+            </a:solidFill>
+          </a:ln>
+        </p:spPr>
+        <p:style>
+          <a:lnRef idx="2">
+            <a:schemeClr val="accent1">
+              <a:shade val="50000"/>
+            </a:schemeClr>
+          </a:lnRef>
+          <a:fillRef idx="1">
+            <a:schemeClr val="accent1"/>
+          </a:fillRef>
+          <a:effectRef idx="0">
+            <a:schemeClr val="accent1"/>
+          </a:effectRef>
+          <a:fontRef idx="minor">
+            <a:schemeClr val="lt1"/>
+          </a:fontRef>
+        </p:style>
+        <p:txBody>
+          <a:bodyPr rtlCol="0" anchor="ctr"/>
+          <a:lstStyle/>
+          <a:p>
+            <a:pPr algn="ctr"/>
+            <a:endParaRPr lang="en-US"/>
+          </a:p>
+        </p:txBody>
+      </p:sp>
+      <p:pic>
+        <p:nvPicPr>
+          <p:cNvPr id="4" name="Picture 3">
+            <a:extLst>
+              <a:ext uri="{FF2B5EF4-FFF2-40B4-BE49-F238E27FC236}">
+                <a16:creationId xmlns:a16="http://schemas.microsoft.com/office/drawing/2014/main" id="{BE9B8F98-F511-3709-19E0-5470112F631E}"/>
+              </a:ext>
+            </a:extLst>
+          </p:cNvPr>
+          <p:cNvPicPr>
+            <a:picLocks noChangeAspect="1"/>
+          </p:cNvPicPr>
+          <p:nvPr/>
+        </p:nvPicPr>
+        <p:blipFill rotWithShape="1">
+          <a:blip r:embed="rId2"/>
+          <a:srcRect l="2917" t="18605" r="7917" b="9612"/>
+          <a:stretch/>
+        </p:blipFill>
+        <p:spPr>
+          <a:xfrm>
+            <a:off x="425303" y="0"/>
+            <a:ext cx="5433238" cy="3385719"/>
+          </a:xfrm>
+          <a:prstGeom prst="rect">
+            <a:avLst/>
+          </a:prstGeom>
+        </p:spPr>
+      </p:pic>
+      <p:pic>
+        <p:nvPicPr>
+          <p:cNvPr id="5" name="Picture 4">
+            <a:extLst>
+              <a:ext uri="{FF2B5EF4-FFF2-40B4-BE49-F238E27FC236}">
+                <a16:creationId xmlns:a16="http://schemas.microsoft.com/office/drawing/2014/main" id="{BB98F31F-E7E5-663A-24E5-E2BCFCB96E6D}"/>
+              </a:ext>
+            </a:extLst>
+          </p:cNvPr>
+          <p:cNvPicPr>
+            <a:picLocks noChangeAspect="1"/>
+          </p:cNvPicPr>
+          <p:nvPr/>
+        </p:nvPicPr>
+        <p:blipFill rotWithShape="1">
+          <a:blip r:embed="rId3"/>
+          <a:srcRect l="2436" t="19536" r="7557" b="7751"/>
+          <a:stretch/>
+        </p:blipFill>
+        <p:spPr>
+          <a:xfrm>
+            <a:off x="425303" y="3143585"/>
+            <a:ext cx="5433238" cy="3397586"/>
+          </a:xfrm>
+          <a:prstGeom prst="rect">
+            <a:avLst/>
+          </a:prstGeom>
+        </p:spPr>
+      </p:pic>
+      <p:pic>
+        <p:nvPicPr>
+          <p:cNvPr id="6" name="Picture 5">
+            <a:extLst>
+              <a:ext uri="{FF2B5EF4-FFF2-40B4-BE49-F238E27FC236}">
+                <a16:creationId xmlns:a16="http://schemas.microsoft.com/office/drawing/2014/main" id="{84CB10A8-C8B6-0FE5-8B07-086121AB4696}"/>
+              </a:ext>
+            </a:extLst>
+          </p:cNvPr>
+          <p:cNvPicPr>
+            <a:picLocks noChangeAspect="1"/>
+          </p:cNvPicPr>
+          <p:nvPr/>
+        </p:nvPicPr>
+        <p:blipFill rotWithShape="1">
+          <a:blip r:embed="rId4"/>
+          <a:srcRect l="2917" t="18139" r="7917" b="15349"/>
+          <a:stretch/>
+        </p:blipFill>
+        <p:spPr>
+          <a:xfrm>
+            <a:off x="425303" y="6198032"/>
+            <a:ext cx="5433238" cy="3137092"/>
+          </a:xfrm>
+          <a:prstGeom prst="rect">
+            <a:avLst/>
+          </a:prstGeom>
+        </p:spPr>
+      </p:pic>
+      <p:pic>
+        <p:nvPicPr>
+          <p:cNvPr id="7" name="Picture 6">
+            <a:extLst>
+              <a:ext uri="{FF2B5EF4-FFF2-40B4-BE49-F238E27FC236}">
+                <a16:creationId xmlns:a16="http://schemas.microsoft.com/office/drawing/2014/main" id="{E3965929-14DC-AE1F-E5A7-8AFF61607111}"/>
+              </a:ext>
+            </a:extLst>
+          </p:cNvPr>
+          <p:cNvPicPr>
+            <a:picLocks noChangeAspect="1"/>
+          </p:cNvPicPr>
+          <p:nvPr/>
+        </p:nvPicPr>
+        <p:blipFill rotWithShape="1">
+          <a:blip r:embed="rId5"/>
+          <a:srcRect l="2316" t="17519" r="8037" b="13953"/>
+          <a:stretch/>
+        </p:blipFill>
+        <p:spPr>
+          <a:xfrm>
+            <a:off x="5996764" y="0"/>
+            <a:ext cx="5433238" cy="3214847"/>
+          </a:xfrm>
+          <a:prstGeom prst="rect">
+            <a:avLst/>
+          </a:prstGeom>
+        </p:spPr>
+      </p:pic>
+      <p:pic>
+        <p:nvPicPr>
+          <p:cNvPr id="8" name="Picture 7">
+            <a:extLst>
+              <a:ext uri="{FF2B5EF4-FFF2-40B4-BE49-F238E27FC236}">
+                <a16:creationId xmlns:a16="http://schemas.microsoft.com/office/drawing/2014/main" id="{2B032F40-2959-2EAB-F884-A0743E027188}"/>
+              </a:ext>
+            </a:extLst>
+          </p:cNvPr>
+          <p:cNvPicPr>
+            <a:picLocks noChangeAspect="1"/>
+          </p:cNvPicPr>
+          <p:nvPr/>
+        </p:nvPicPr>
+        <p:blipFill rotWithShape="1">
+          <a:blip r:embed="rId6"/>
+          <a:srcRect l="2557" t="18140" r="6357" b="9623"/>
+          <a:stretch/>
+        </p:blipFill>
+        <p:spPr>
+          <a:xfrm>
+            <a:off x="5996764" y="3143585"/>
+            <a:ext cx="5534673" cy="3397586"/>
+          </a:xfrm>
+          <a:prstGeom prst="rect">
+            <a:avLst/>
+          </a:prstGeom>
+        </p:spPr>
+      </p:pic>
+    </p:spTree>
+    <p:extLst>
+      <p:ext uri="{BB962C8B-B14F-4D97-AF65-F5344CB8AC3E}">
+        <p14:creationId xmlns:p14="http://schemas.microsoft.com/office/powerpoint/2010/main" val="1416786149"/>
+      </p:ext>
+    </p:extLst>
+  </p:cSld>
+  <p:clrMapOvr>
+    <a:masterClrMapping/>
+  </p:clrMapOvr>
+</p:sld>
+</file>
+
 <file path=ppt/slides/slide2.xml><?xml version="1.0" encoding="utf-8"?>
 <p:sld xmlns:a="http://schemas.openxmlformats.org/drawingml/2006/main" xmlns:r="http://schemas.openxmlformats.org/officeDocument/2006/relationships" xmlns:p="http://schemas.openxmlformats.org/presentationml/2006/main">
   <p:cSld>

</xml_diff>